<commit_message>
Update 1821005_yoshioka_sotuken - 20210709.pptx
</commit_message>
<xml_diff>
--- a/1821005_yoshioka_sotuken - 20210709.pptx
+++ b/1821005_yoshioka_sotuken - 20210709.pptx
@@ -208,7 +208,7 @@
           <a:p>
             <a:fld id="{53E08A37-27B0-48AE-881C-B823B94E0A37}" type="datetimeFigureOut">
               <a:rPr kumimoji="1" lang="ja-JP" altLang="en-US" smtClean="0"/>
-              <a:t>2021/7/8</a:t>
+              <a:t>2021/7/23</a:t>
             </a:fld>
             <a:endParaRPr kumimoji="1" lang="ja-JP" altLang="en-US"/>
           </a:p>
@@ -639,7 +639,7 @@
           <a:p>
             <a:fld id="{777BCA22-9404-4EAD-B600-E5D0D5F14758}" type="datetime1">
               <a:rPr kumimoji="1" lang="ja-JP" altLang="en-US" smtClean="0"/>
-              <a:t>2021/7/8</a:t>
+              <a:t>2021/7/23</a:t>
             </a:fld>
             <a:endParaRPr kumimoji="1" lang="ja-JP" altLang="en-US"/>
           </a:p>
@@ -841,7 +841,7 @@
           <a:p>
             <a:fld id="{65B3E365-8942-46AE-8EB0-09708B58B06E}" type="datetime1">
               <a:rPr kumimoji="1" lang="ja-JP" altLang="en-US" smtClean="0"/>
-              <a:t>2021/7/8</a:t>
+              <a:t>2021/7/23</a:t>
             </a:fld>
             <a:endParaRPr kumimoji="1" lang="ja-JP" altLang="en-US"/>
           </a:p>
@@ -1053,7 +1053,7 @@
           <a:p>
             <a:fld id="{FFD1B8DB-7476-41E6-A4D2-B8CC263F7ACE}" type="datetime1">
               <a:rPr kumimoji="1" lang="ja-JP" altLang="en-US" smtClean="0"/>
-              <a:t>2021/7/8</a:t>
+              <a:t>2021/7/23</a:t>
             </a:fld>
             <a:endParaRPr kumimoji="1" lang="ja-JP" altLang="en-US"/>
           </a:p>
@@ -1255,7 +1255,7 @@
           <a:p>
             <a:fld id="{C1775DBA-A6B2-4F32-815E-884FBB6D7804}" type="datetime1">
               <a:rPr kumimoji="1" lang="ja-JP" altLang="en-US" smtClean="0"/>
-              <a:t>2021/7/8</a:t>
+              <a:t>2021/7/23</a:t>
             </a:fld>
             <a:endParaRPr kumimoji="1" lang="ja-JP" altLang="en-US"/>
           </a:p>
@@ -1499,7 +1499,7 @@
           <a:p>
             <a:fld id="{9174E00D-6DCB-4D4E-87A0-FE20DA5F0465}" type="datetime1">
               <a:rPr kumimoji="1" lang="ja-JP" altLang="en-US" smtClean="0"/>
-              <a:t>2021/7/8</a:t>
+              <a:t>2021/7/23</a:t>
             </a:fld>
             <a:endParaRPr kumimoji="1" lang="ja-JP" altLang="en-US"/>
           </a:p>
@@ -1795,7 +1795,7 @@
           <a:p>
             <a:fld id="{1E35631C-BEBB-4154-876E-7690D34F1DC8}" type="datetime1">
               <a:rPr kumimoji="1" lang="ja-JP" altLang="en-US" smtClean="0"/>
-              <a:t>2021/7/8</a:t>
+              <a:t>2021/7/23</a:t>
             </a:fld>
             <a:endParaRPr kumimoji="1" lang="ja-JP" altLang="en-US"/>
           </a:p>
@@ -2226,7 +2226,7 @@
           <a:p>
             <a:fld id="{61CCA7E4-DD06-47A6-A9BF-5514CFA3738D}" type="datetime1">
               <a:rPr kumimoji="1" lang="ja-JP" altLang="en-US" smtClean="0"/>
-              <a:t>2021/7/8</a:t>
+              <a:t>2021/7/23</a:t>
             </a:fld>
             <a:endParaRPr kumimoji="1" lang="ja-JP" altLang="en-US"/>
           </a:p>
@@ -2344,7 +2344,7 @@
           <a:p>
             <a:fld id="{C2D7ACD4-93BF-456B-9C65-6572D2D89EFB}" type="datetime1">
               <a:rPr kumimoji="1" lang="ja-JP" altLang="en-US" smtClean="0"/>
-              <a:t>2021/7/8</a:t>
+              <a:t>2021/7/23</a:t>
             </a:fld>
             <a:endParaRPr kumimoji="1" lang="ja-JP" altLang="en-US"/>
           </a:p>
@@ -2439,7 +2439,7 @@
           <a:p>
             <a:fld id="{E6E063D4-91D8-4B21-9A43-6932836FF006}" type="datetime1">
               <a:rPr kumimoji="1" lang="ja-JP" altLang="en-US" smtClean="0"/>
-              <a:t>2021/7/8</a:t>
+              <a:t>2021/7/23</a:t>
             </a:fld>
             <a:endParaRPr kumimoji="1" lang="ja-JP" altLang="en-US"/>
           </a:p>
@@ -2748,7 +2748,7 @@
           <a:p>
             <a:fld id="{2CE8BC5D-8696-4761-A671-A859DD02E086}" type="datetime1">
               <a:rPr kumimoji="1" lang="ja-JP" altLang="en-US" smtClean="0"/>
-              <a:t>2021/7/8</a:t>
+              <a:t>2021/7/23</a:t>
             </a:fld>
             <a:endParaRPr kumimoji="1" lang="ja-JP" altLang="en-US"/>
           </a:p>
@@ -3005,7 +3005,7 @@
           <a:p>
             <a:fld id="{82735B9C-9FB4-4E9A-9540-F617C773E17B}" type="datetime1">
               <a:rPr kumimoji="1" lang="ja-JP" altLang="en-US" smtClean="0"/>
-              <a:t>2021/7/8</a:t>
+              <a:t>2021/7/23</a:t>
             </a:fld>
             <a:endParaRPr kumimoji="1" lang="ja-JP" altLang="en-US"/>
           </a:p>
@@ -3250,7 +3250,7 @@
           <a:p>
             <a:fld id="{11B88BD9-34AC-4954-9FD5-D852B338DEC1}" type="datetime1">
               <a:rPr kumimoji="1" lang="ja-JP" altLang="en-US" smtClean="0"/>
-              <a:t>2021/7/8</a:t>
+              <a:t>2021/7/23</a:t>
             </a:fld>
             <a:endParaRPr kumimoji="1" lang="ja-JP" altLang="en-US"/>
           </a:p>
@@ -5199,8 +5199,8 @@
           </a:prstGeom>
         </p:spPr>
       </p:pic>
-      <mc:AlternateContent xmlns:mc="http://schemas.openxmlformats.org/markup-compatibility/2006">
-        <mc:Choice xmlns:a14="http://schemas.microsoft.com/office/drawing/2010/main" Requires="a14">
+      <mc:AlternateContent xmlns:mc="http://schemas.openxmlformats.org/markup-compatibility/2006" xmlns:a14="http://schemas.microsoft.com/office/drawing/2010/main">
+        <mc:Choice Requires="a14">
           <p:sp>
             <p:nvSpPr>
               <p:cNvPr id="7" name="テキスト ボックス 6"/>
@@ -5249,6 +5249,7 @@
                 <a:endParaRPr kumimoji="1" lang="en-US" altLang="ja-JP" dirty="0" smtClean="0"/>
               </a:p>
               <a:p>
+                <a:pPr/>
                 <a14:m>
                   <m:oMathPara xmlns:m="http://schemas.openxmlformats.org/officeDocument/2006/math">
                     <m:oMathParaPr>
@@ -5330,7 +5331,7 @@
             </p:txBody>
           </p:sp>
         </mc:Choice>
-        <mc:Fallback>
+        <mc:Fallback xmlns="">
           <p:sp>
             <p:nvSpPr>
               <p:cNvPr id="7" name="テキスト ボックス 6"/>

</xml_diff>